<commit_message>
retour de Mihai le 21 javier 2019
</commit_message>
<xml_diff>
--- a/to be ranged/CH.XX Mise à Points des outils numériques/figures/figure.pptx
+++ b/to be ranged/CH.XX Mise à Points des outils numériques/figures/figure.pptx
@@ -5,13 +5,14 @@
     <p:sldMasterId id="2147483648" r:id="rId1"/>
   </p:sldMasterIdLst>
   <p:notesMasterIdLst>
-    <p:notesMasterId r:id="rId6"/>
+    <p:notesMasterId r:id="rId7"/>
   </p:notesMasterIdLst>
   <p:sldIdLst>
     <p:sldId id="263" r:id="rId2"/>
     <p:sldId id="264" r:id="rId3"/>
     <p:sldId id="265" r:id="rId4"/>
     <p:sldId id="266" r:id="rId5"/>
+    <p:sldId id="267" r:id="rId6"/>
   </p:sldIdLst>
   <p:sldSz cx="12192000" cy="6858000"/>
   <p:notesSz cx="6858000" cy="9926638"/>
@@ -200,7 +201,7 @@
           <a:p>
             <a:fld id="{42D30341-7FEA-4EBA-8C94-D6EAB4B64397}" type="datetimeFigureOut">
               <a:rPr lang="fr-FR" smtClean="0"/>
-              <a:t>25/09/2018</a:t>
+              <a:t>21/01/2019</a:t>
             </a:fld>
             <a:endParaRPr lang="fr-FR"/>
           </a:p>
@@ -683,7 +684,7 @@
           <a:p>
             <a:fld id="{C001D32E-42E9-48CB-B1BA-2416B2F1CC2A}" type="datetimeFigureOut">
               <a:rPr lang="fr-FR" smtClean="0"/>
-              <a:t>25/09/2018</a:t>
+              <a:t>21/01/2019</a:t>
             </a:fld>
             <a:endParaRPr lang="fr-FR"/>
           </a:p>
@@ -853,7 +854,7 @@
           <a:p>
             <a:fld id="{C001D32E-42E9-48CB-B1BA-2416B2F1CC2A}" type="datetimeFigureOut">
               <a:rPr lang="fr-FR" smtClean="0"/>
-              <a:t>25/09/2018</a:t>
+              <a:t>21/01/2019</a:t>
             </a:fld>
             <a:endParaRPr lang="fr-FR"/>
           </a:p>
@@ -1033,7 +1034,7 @@
           <a:p>
             <a:fld id="{C001D32E-42E9-48CB-B1BA-2416B2F1CC2A}" type="datetimeFigureOut">
               <a:rPr lang="fr-FR" smtClean="0"/>
-              <a:t>25/09/2018</a:t>
+              <a:t>21/01/2019</a:t>
             </a:fld>
             <a:endParaRPr lang="fr-FR"/>
           </a:p>
@@ -1203,7 +1204,7 @@
           <a:p>
             <a:fld id="{C001D32E-42E9-48CB-B1BA-2416B2F1CC2A}" type="datetimeFigureOut">
               <a:rPr lang="fr-FR" smtClean="0"/>
-              <a:t>25/09/2018</a:t>
+              <a:t>21/01/2019</a:t>
             </a:fld>
             <a:endParaRPr lang="fr-FR"/>
           </a:p>
@@ -1449,7 +1450,7 @@
           <a:p>
             <a:fld id="{C001D32E-42E9-48CB-B1BA-2416B2F1CC2A}" type="datetimeFigureOut">
               <a:rPr lang="fr-FR" smtClean="0"/>
-              <a:t>25/09/2018</a:t>
+              <a:t>21/01/2019</a:t>
             </a:fld>
             <a:endParaRPr lang="fr-FR"/>
           </a:p>
@@ -1681,7 +1682,7 @@
           <a:p>
             <a:fld id="{C001D32E-42E9-48CB-B1BA-2416B2F1CC2A}" type="datetimeFigureOut">
               <a:rPr lang="fr-FR" smtClean="0"/>
-              <a:t>25/09/2018</a:t>
+              <a:t>21/01/2019</a:t>
             </a:fld>
             <a:endParaRPr lang="fr-FR"/>
           </a:p>
@@ -2048,7 +2049,7 @@
           <a:p>
             <a:fld id="{C001D32E-42E9-48CB-B1BA-2416B2F1CC2A}" type="datetimeFigureOut">
               <a:rPr lang="fr-FR" smtClean="0"/>
-              <a:t>25/09/2018</a:t>
+              <a:t>21/01/2019</a:t>
             </a:fld>
             <a:endParaRPr lang="fr-FR"/>
           </a:p>
@@ -2166,7 +2167,7 @@
           <a:p>
             <a:fld id="{C001D32E-42E9-48CB-B1BA-2416B2F1CC2A}" type="datetimeFigureOut">
               <a:rPr lang="fr-FR" smtClean="0"/>
-              <a:t>25/09/2018</a:t>
+              <a:t>21/01/2019</a:t>
             </a:fld>
             <a:endParaRPr lang="fr-FR"/>
           </a:p>
@@ -2261,7 +2262,7 @@
           <a:p>
             <a:fld id="{C001D32E-42E9-48CB-B1BA-2416B2F1CC2A}" type="datetimeFigureOut">
               <a:rPr lang="fr-FR" smtClean="0"/>
-              <a:t>25/09/2018</a:t>
+              <a:t>21/01/2019</a:t>
             </a:fld>
             <a:endParaRPr lang="fr-FR"/>
           </a:p>
@@ -2538,7 +2539,7 @@
           <a:p>
             <a:fld id="{C001D32E-42E9-48CB-B1BA-2416B2F1CC2A}" type="datetimeFigureOut">
               <a:rPr lang="fr-FR" smtClean="0"/>
-              <a:t>25/09/2018</a:t>
+              <a:t>21/01/2019</a:t>
             </a:fld>
             <a:endParaRPr lang="fr-FR"/>
           </a:p>
@@ -2791,7 +2792,7 @@
           <a:p>
             <a:fld id="{C001D32E-42E9-48CB-B1BA-2416B2F1CC2A}" type="datetimeFigureOut">
               <a:rPr lang="fr-FR" smtClean="0"/>
-              <a:t>25/09/2018</a:t>
+              <a:t>21/01/2019</a:t>
             </a:fld>
             <a:endParaRPr lang="fr-FR"/>
           </a:p>
@@ -3004,7 +3005,7 @@
           <a:p>
             <a:fld id="{C001D32E-42E9-48CB-B1BA-2416B2F1CC2A}" type="datetimeFigureOut">
               <a:rPr lang="fr-FR" smtClean="0"/>
-              <a:t>25/09/2018</a:t>
+              <a:t>21/01/2019</a:t>
             </a:fld>
             <a:endParaRPr lang="fr-FR"/>
           </a:p>
@@ -7199,8 +7200,8 @@
                     </a:fontRef>
                   </p:style>
                 </p:cxnSp>
-                <mc:AlternateContent xmlns:mc="http://schemas.openxmlformats.org/markup-compatibility/2006">
-                  <mc:Choice xmlns:a14="http://schemas.microsoft.com/office/drawing/2010/main" Requires="a14">
+                <mc:AlternateContent xmlns:mc="http://schemas.openxmlformats.org/markup-compatibility/2006" xmlns:a14="http://schemas.microsoft.com/office/drawing/2010/main">
+                  <mc:Choice Requires="a14">
                     <p:sp>
                       <p:nvSpPr>
                         <p:cNvPr id="182" name="Zone de texte 153"/>
@@ -7300,7 +7301,7 @@
                       </p:txBody>
                     </p:sp>
                   </mc:Choice>
-                  <mc:Fallback>
+                  <mc:Fallback xmlns="">
                     <p:sp>
                       <p:nvSpPr>
                         <p:cNvPr id="182" name="Zone de texte 153"/>
@@ -7373,8 +7374,8 @@
                       <a:chExt cx="2572295" cy="2963951"/>
                     </a:xfrm>
                   </p:grpSpPr>
-                  <mc:AlternateContent xmlns:mc="http://schemas.openxmlformats.org/markup-compatibility/2006">
-                    <mc:Choice xmlns:a14="http://schemas.microsoft.com/office/drawing/2010/main" Requires="a14">
+                  <mc:AlternateContent xmlns:mc="http://schemas.openxmlformats.org/markup-compatibility/2006" xmlns:a14="http://schemas.microsoft.com/office/drawing/2010/main">
+                    <mc:Choice Requires="a14">
                       <p:sp>
                         <p:nvSpPr>
                           <p:cNvPr id="159" name="ZoneTexte 158"/>
@@ -7456,7 +7457,7 @@
                         </p:txBody>
                       </p:sp>
                     </mc:Choice>
-                    <mc:Fallback>
+                    <mc:Fallback xmlns="">
                       <p:sp>
                         <p:nvSpPr>
                           <p:cNvPr id="159" name="ZoneTexte 158"/>
@@ -7626,8 +7627,8 @@
                             </p:style>
                           </p:cxnSp>
                         </p:grpSp>
-                        <mc:AlternateContent xmlns:mc="http://schemas.openxmlformats.org/markup-compatibility/2006">
-                          <mc:Choice xmlns:a14="http://schemas.microsoft.com/office/drawing/2010/main" Requires="a14">
+                        <mc:AlternateContent xmlns:mc="http://schemas.openxmlformats.org/markup-compatibility/2006" xmlns:a14="http://schemas.microsoft.com/office/drawing/2010/main">
+                          <mc:Choice Requires="a14">
                             <p:sp>
                               <p:nvSpPr>
                                 <p:cNvPr id="177" name="Zone de texte 153"/>
@@ -7725,7 +7726,7 @@
                               </p:txBody>
                             </p:sp>
                           </mc:Choice>
-                          <mc:Fallback>
+                          <mc:Fallback xmlns="">
                             <p:sp>
                               <p:nvSpPr>
                                 <p:cNvPr id="177" name="Zone de texte 153"/>
@@ -7769,8 +7770,8 @@
                             </p:sp>
                           </mc:Fallback>
                         </mc:AlternateContent>
-                        <mc:AlternateContent xmlns:mc="http://schemas.openxmlformats.org/markup-compatibility/2006">
-                          <mc:Choice xmlns:a14="http://schemas.microsoft.com/office/drawing/2010/main" Requires="a14">
+                        <mc:AlternateContent xmlns:mc="http://schemas.openxmlformats.org/markup-compatibility/2006" xmlns:a14="http://schemas.microsoft.com/office/drawing/2010/main">
+                          <mc:Choice Requires="a14">
                             <p:sp>
                               <p:nvSpPr>
                                 <p:cNvPr id="178" name="Zone de texte 154"/>
@@ -7868,7 +7869,7 @@
                               </p:txBody>
                             </p:sp>
                           </mc:Choice>
-                          <mc:Fallback>
+                          <mc:Fallback xmlns="">
                             <p:sp>
                               <p:nvSpPr>
                                 <p:cNvPr id="178" name="Zone de texte 154"/>
@@ -8078,8 +8079,8 @@
                           </a:p>
                         </p:txBody>
                       </p:sp>
-                      <mc:AlternateContent xmlns:mc="http://schemas.openxmlformats.org/markup-compatibility/2006">
-                        <mc:Choice xmlns:a14="http://schemas.microsoft.com/office/drawing/2010/main" Requires="a14">
+                      <mc:AlternateContent xmlns:mc="http://schemas.openxmlformats.org/markup-compatibility/2006" xmlns:a14="http://schemas.microsoft.com/office/drawing/2010/main">
+                        <mc:Choice Requires="a14">
                           <p:sp>
                             <p:nvSpPr>
                               <p:cNvPr id="208" name="ZoneTexte 207"/>
@@ -8102,6 +8103,7 @@
                               </a:bodyPr>
                               <a:lstStyle/>
                               <a:p>
+                                <a:pPr/>
                                 <a14:m>
                                   <m:oMathPara xmlns:m="http://schemas.openxmlformats.org/officeDocument/2006/math">
                                     <m:oMathParaPr>
@@ -8150,7 +8152,7 @@
                             </p:txBody>
                           </p:sp>
                         </mc:Choice>
-                        <mc:Fallback>
+                        <mc:Fallback xmlns="">
                           <p:sp>
                             <p:nvSpPr>
                               <p:cNvPr id="208" name="ZoneTexte 207"/>
@@ -8252,8 +8254,8 @@
                           </a:p>
                         </p:txBody>
                       </p:sp>
-                      <mc:AlternateContent xmlns:mc="http://schemas.openxmlformats.org/markup-compatibility/2006">
-                        <mc:Choice xmlns:a14="http://schemas.microsoft.com/office/drawing/2010/main" Requires="a14">
+                      <mc:AlternateContent xmlns:mc="http://schemas.openxmlformats.org/markup-compatibility/2006" xmlns:a14="http://schemas.microsoft.com/office/drawing/2010/main">
+                        <mc:Choice Requires="a14">
                           <p:sp>
                             <p:nvSpPr>
                               <p:cNvPr id="211" name="ZoneTexte 210"/>
@@ -8276,6 +8278,7 @@
                               </a:bodyPr>
                               <a:lstStyle/>
                               <a:p>
+                                <a:pPr/>
                                 <a14:m>
                                   <m:oMathPara xmlns:m="http://schemas.openxmlformats.org/officeDocument/2006/math">
                                     <m:oMathParaPr>
@@ -8324,7 +8327,7 @@
                             </p:txBody>
                           </p:sp>
                         </mc:Choice>
-                        <mc:Fallback>
+                        <mc:Fallback xmlns="">
                           <p:sp>
                             <p:nvSpPr>
                               <p:cNvPr id="211" name="ZoneTexte 210"/>
@@ -8426,8 +8429,8 @@
                           </a:p>
                         </p:txBody>
                       </p:sp>
-                      <mc:AlternateContent xmlns:mc="http://schemas.openxmlformats.org/markup-compatibility/2006">
-                        <mc:Choice xmlns:a14="http://schemas.microsoft.com/office/drawing/2010/main" Requires="a14">
+                      <mc:AlternateContent xmlns:mc="http://schemas.openxmlformats.org/markup-compatibility/2006" xmlns:a14="http://schemas.microsoft.com/office/drawing/2010/main">
+                        <mc:Choice Requires="a14">
                           <p:sp>
                             <p:nvSpPr>
                               <p:cNvPr id="215" name="ZoneTexte 214"/>
@@ -8450,6 +8453,7 @@
                               </a:bodyPr>
                               <a:lstStyle/>
                               <a:p>
+                                <a:pPr/>
                                 <a14:m>
                                   <m:oMathPara xmlns:m="http://schemas.openxmlformats.org/officeDocument/2006/math">
                                     <m:oMathParaPr>
@@ -8477,7 +8481,7 @@
                             </p:txBody>
                           </p:sp>
                         </mc:Choice>
-                        <mc:Fallback>
+                        <mc:Fallback xmlns="">
                           <p:sp>
                             <p:nvSpPr>
                               <p:cNvPr id="215" name="ZoneTexte 214"/>
@@ -8647,8 +8651,8 @@
                             </a:fontRef>
                           </p:style>
                         </p:cxnSp>
-                        <mc:AlternateContent xmlns:mc="http://schemas.openxmlformats.org/markup-compatibility/2006">
-                          <mc:Choice xmlns:a14="http://schemas.microsoft.com/office/drawing/2010/main" Requires="a14">
+                        <mc:AlternateContent xmlns:mc="http://schemas.openxmlformats.org/markup-compatibility/2006" xmlns:a14="http://schemas.microsoft.com/office/drawing/2010/main">
+                          <mc:Choice Requires="a14">
                             <p:sp>
                               <p:nvSpPr>
                                 <p:cNvPr id="66" name="Zone de texte 153"/>
@@ -8745,7 +8749,7 @@
                               </p:txBody>
                             </p:sp>
                           </mc:Choice>
-                          <mc:Fallback>
+                          <mc:Fallback xmlns="">
                             <p:sp>
                               <p:nvSpPr>
                                 <p:cNvPr id="66" name="Zone de texte 153"/>
@@ -8788,8 +8792,8 @@
                             </p:sp>
                           </mc:Fallback>
                         </mc:AlternateContent>
-                        <mc:AlternateContent xmlns:mc="http://schemas.openxmlformats.org/markup-compatibility/2006">
-                          <mc:Choice xmlns:a14="http://schemas.microsoft.com/office/drawing/2010/main" Requires="a14">
+                        <mc:AlternateContent xmlns:mc="http://schemas.openxmlformats.org/markup-compatibility/2006" xmlns:a14="http://schemas.microsoft.com/office/drawing/2010/main">
+                          <mc:Choice Requires="a14">
                             <p:sp>
                               <p:nvSpPr>
                                 <p:cNvPr id="67" name="Zone de texte 154"/>
@@ -8886,7 +8890,7 @@
                               </p:txBody>
                             </p:sp>
                           </mc:Choice>
-                          <mc:Fallback>
+                          <mc:Fallback xmlns="">
                             <p:sp>
                               <p:nvSpPr>
                                 <p:cNvPr id="67" name="Zone de texte 154"/>
@@ -9115,8 +9119,8 @@
                                   </a:fontRef>
                                 </p:style>
                               </p:cxnSp>
-                              <mc:AlternateContent xmlns:mc="http://schemas.openxmlformats.org/markup-compatibility/2006">
-                                <mc:Choice xmlns:a14="http://schemas.microsoft.com/office/drawing/2010/main" Requires="a14">
+                              <mc:AlternateContent xmlns:mc="http://schemas.openxmlformats.org/markup-compatibility/2006" xmlns:a14="http://schemas.microsoft.com/office/drawing/2010/main">
+                                <mc:Choice Requires="a14">
                                   <p:sp>
                                     <p:nvSpPr>
                                       <p:cNvPr id="95" name="Zone de texte 153"/>
@@ -9216,7 +9220,7 @@
                                     </p:txBody>
                                   </p:sp>
                                 </mc:Choice>
-                                <mc:Fallback>
+                                <mc:Fallback xmlns="">
                                   <p:sp>
                                     <p:nvSpPr>
                                       <p:cNvPr id="95" name="Zone de texte 153"/>
@@ -9772,8 +9776,8 @@
                               </p:grpSp>
                             </p:grpSp>
                           </p:grpSp>
-                          <mc:AlternateContent xmlns:mc="http://schemas.openxmlformats.org/markup-compatibility/2006">
-                            <mc:Choice xmlns:a14="http://schemas.microsoft.com/office/drawing/2010/main" Requires="a14">
+                          <mc:AlternateContent xmlns:mc="http://schemas.openxmlformats.org/markup-compatibility/2006" xmlns:a14="http://schemas.microsoft.com/office/drawing/2010/main">
+                            <mc:Choice Requires="a14">
                               <p:sp>
                                 <p:nvSpPr>
                                   <p:cNvPr id="80" name="ZoneTexte 79"/>
@@ -9855,7 +9859,7 @@
                                 </p:txBody>
                               </p:sp>
                             </mc:Choice>
-                            <mc:Fallback>
+                            <mc:Fallback xmlns="">
                               <p:sp>
                                 <p:nvSpPr>
                                   <p:cNvPr id="80" name="ZoneTexte 79"/>
@@ -10068,8 +10072,8 @@
                           </a:p>
                         </p:txBody>
                       </p:sp>
-                      <mc:AlternateContent xmlns:mc="http://schemas.openxmlformats.org/markup-compatibility/2006">
-                        <mc:Choice xmlns:a14="http://schemas.microsoft.com/office/drawing/2010/main" Requires="a14">
+                      <mc:AlternateContent xmlns:mc="http://schemas.openxmlformats.org/markup-compatibility/2006" xmlns:a14="http://schemas.microsoft.com/office/drawing/2010/main">
+                        <mc:Choice Requires="a14">
                           <p:sp>
                             <p:nvSpPr>
                               <p:cNvPr id="197" name="ZoneTexte 196"/>
@@ -10092,6 +10096,7 @@
                               </a:bodyPr>
                               <a:lstStyle/>
                               <a:p>
+                                <a:pPr/>
                                 <a14:m>
                                   <m:oMathPara xmlns:m="http://schemas.openxmlformats.org/officeDocument/2006/math">
                                     <m:oMathParaPr>
@@ -10140,7 +10145,7 @@
                             </p:txBody>
                           </p:sp>
                         </mc:Choice>
-                        <mc:Fallback>
+                        <mc:Fallback xmlns="">
                           <p:sp>
                             <p:nvSpPr>
                               <p:cNvPr id="197" name="ZoneTexte 196"/>
@@ -10242,8 +10247,8 @@
                           </a:p>
                         </p:txBody>
                       </p:sp>
-                      <mc:AlternateContent xmlns:mc="http://schemas.openxmlformats.org/markup-compatibility/2006">
-                        <mc:Choice xmlns:a14="http://schemas.microsoft.com/office/drawing/2010/main" Requires="a14">
+                      <mc:AlternateContent xmlns:mc="http://schemas.openxmlformats.org/markup-compatibility/2006" xmlns:a14="http://schemas.microsoft.com/office/drawing/2010/main">
+                        <mc:Choice Requires="a14">
                           <p:sp>
                             <p:nvSpPr>
                               <p:cNvPr id="220" name="ZoneTexte 219"/>
@@ -10266,6 +10271,7 @@
                               </a:bodyPr>
                               <a:lstStyle/>
                               <a:p>
+                                <a:pPr/>
                                 <a14:m>
                                   <m:oMathPara xmlns:m="http://schemas.openxmlformats.org/officeDocument/2006/math">
                                     <m:oMathParaPr>
@@ -10339,7 +10345,7 @@
                             </p:txBody>
                           </p:sp>
                         </mc:Choice>
-                        <mc:Fallback>
+                        <mc:Fallback xmlns="">
                           <p:sp>
                             <p:nvSpPr>
                               <p:cNvPr id="220" name="ZoneTexte 219"/>
@@ -10431,8 +10437,8 @@
                         </a:fontRef>
                       </p:style>
                     </p:cxnSp>
-                    <mc:AlternateContent xmlns:mc="http://schemas.openxmlformats.org/markup-compatibility/2006">
-                      <mc:Choice xmlns:a14="http://schemas.microsoft.com/office/drawing/2010/main" Requires="a14">
+                    <mc:AlternateContent xmlns:mc="http://schemas.openxmlformats.org/markup-compatibility/2006" xmlns:a14="http://schemas.microsoft.com/office/drawing/2010/main">
+                      <mc:Choice Requires="a14">
                         <p:sp>
                           <p:nvSpPr>
                             <p:cNvPr id="223" name="Zone de texte 153"/>
@@ -10532,7 +10538,7 @@
                           </p:txBody>
                         </p:sp>
                       </mc:Choice>
-                      <mc:Fallback>
+                      <mc:Fallback xmlns="">
                         <p:sp>
                           <p:nvSpPr>
                             <p:cNvPr id="223" name="Zone de texte 153"/>
@@ -10639,8 +10645,8 @@
                         </a:p>
                       </p:txBody>
                     </p:sp>
-                    <mc:AlternateContent xmlns:mc="http://schemas.openxmlformats.org/markup-compatibility/2006">
-                      <mc:Choice xmlns:a14="http://schemas.microsoft.com/office/drawing/2010/main" Requires="a14">
+                    <mc:AlternateContent xmlns:mc="http://schemas.openxmlformats.org/markup-compatibility/2006" xmlns:a14="http://schemas.microsoft.com/office/drawing/2010/main">
+                      <mc:Choice Requires="a14">
                         <p:sp>
                           <p:nvSpPr>
                             <p:cNvPr id="226" name="ZoneTexte 225"/>
@@ -10663,6 +10669,7 @@
                             </a:bodyPr>
                             <a:lstStyle/>
                             <a:p>
+                              <a:pPr/>
                               <a14:m>
                                 <m:oMathPara xmlns:m="http://schemas.openxmlformats.org/officeDocument/2006/math">
                                   <m:oMathParaPr>
@@ -10683,7 +10690,7 @@
                           </p:txBody>
                         </p:sp>
                       </mc:Choice>
-                      <mc:Fallback>
+                      <mc:Fallback xmlns="">
                         <p:sp>
                           <p:nvSpPr>
                             <p:cNvPr id="226" name="ZoneTexte 225"/>
@@ -10726,8 +10733,8 @@
                 </p:grpSp>
               </p:grpSp>
             </p:grpSp>
-            <mc:AlternateContent xmlns:mc="http://schemas.openxmlformats.org/markup-compatibility/2006">
-              <mc:Choice xmlns:a14="http://schemas.microsoft.com/office/drawing/2010/main" Requires="a14">
+            <mc:AlternateContent xmlns:mc="http://schemas.openxmlformats.org/markup-compatibility/2006" xmlns:a14="http://schemas.microsoft.com/office/drawing/2010/main">
+              <mc:Choice Requires="a14">
                 <p:sp>
                   <p:nvSpPr>
                     <p:cNvPr id="309" name="ZoneTexte 308"/>
@@ -10750,7 +10757,6 @@
                     </a:bodyPr>
                     <a:lstStyle/>
                     <a:p>
-                      <a:pPr/>
                       <a14:m>
                         <m:oMath xmlns:m="http://schemas.openxmlformats.org/officeDocument/2006/math">
                           <m:r>
@@ -10782,7 +10788,7 @@
                   </p:txBody>
                 </p:sp>
               </mc:Choice>
-              <mc:Fallback>
+              <mc:Fallback xmlns="">
                 <p:sp>
                   <p:nvSpPr>
                     <p:cNvPr id="309" name="ZoneTexte 308"/>
@@ -10821,8 +10827,8 @@
                 </p:sp>
               </mc:Fallback>
             </mc:AlternateContent>
-            <mc:AlternateContent xmlns:mc="http://schemas.openxmlformats.org/markup-compatibility/2006">
-              <mc:Choice xmlns:a14="http://schemas.microsoft.com/office/drawing/2010/main" Requires="a14">
+            <mc:AlternateContent xmlns:mc="http://schemas.openxmlformats.org/markup-compatibility/2006" xmlns:a14="http://schemas.microsoft.com/office/drawing/2010/main">
+              <mc:Choice Requires="a14">
                 <p:sp>
                   <p:nvSpPr>
                     <p:cNvPr id="310" name="ZoneTexte 309"/>
@@ -10890,7 +10896,7 @@
                   </p:txBody>
                 </p:sp>
               </mc:Choice>
-              <mc:Fallback>
+              <mc:Fallback xmlns="">
                 <p:sp>
                   <p:nvSpPr>
                     <p:cNvPr id="310" name="ZoneTexte 309"/>
@@ -11384,8 +11390,8 @@
             </p:txBody>
           </p:sp>
         </p:grpSp>
-        <mc:AlternateContent xmlns:mc="http://schemas.openxmlformats.org/markup-compatibility/2006">
-          <mc:Choice xmlns:a14="http://schemas.microsoft.com/office/drawing/2010/main" Requires="a14">
+        <mc:AlternateContent xmlns:mc="http://schemas.openxmlformats.org/markup-compatibility/2006" xmlns:a14="http://schemas.microsoft.com/office/drawing/2010/main">
+          <mc:Choice Requires="a14">
             <p:sp>
               <p:nvSpPr>
                 <p:cNvPr id="481" name="ZoneTexte 480"/>
@@ -11448,7 +11454,7 @@
               </p:txBody>
             </p:sp>
           </mc:Choice>
-          <mc:Fallback>
+          <mc:Fallback xmlns="">
             <p:sp>
               <p:nvSpPr>
                 <p:cNvPr id="481" name="ZoneTexte 480"/>
@@ -11487,8 +11493,8 @@
             </p:sp>
           </mc:Fallback>
         </mc:AlternateContent>
-        <mc:AlternateContent xmlns:mc="http://schemas.openxmlformats.org/markup-compatibility/2006">
-          <mc:Choice xmlns:a14="http://schemas.microsoft.com/office/drawing/2010/main" Requires="a14">
+        <mc:AlternateContent xmlns:mc="http://schemas.openxmlformats.org/markup-compatibility/2006" xmlns:a14="http://schemas.microsoft.com/office/drawing/2010/main">
+          <mc:Choice Requires="a14">
             <p:sp>
               <p:nvSpPr>
                 <p:cNvPr id="482" name="ZoneTexte 481"/>
@@ -11551,7 +11557,7 @@
               </p:txBody>
             </p:sp>
           </mc:Choice>
-          <mc:Fallback>
+          <mc:Fallback xmlns="">
             <p:sp>
               <p:nvSpPr>
                 <p:cNvPr id="482" name="ZoneTexte 481"/>
@@ -13268,8 +13274,8 @@
                 </p:style>
               </p:cxnSp>
             </p:grpSp>
-            <mc:AlternateContent xmlns:mc="http://schemas.openxmlformats.org/markup-compatibility/2006">
-              <mc:Choice xmlns:a14="http://schemas.microsoft.com/office/drawing/2010/main" Requires="a14">
+            <mc:AlternateContent xmlns:mc="http://schemas.openxmlformats.org/markup-compatibility/2006" xmlns:a14="http://schemas.microsoft.com/office/drawing/2010/main">
+              <mc:Choice Requires="a14">
                 <p:sp>
                   <p:nvSpPr>
                     <p:cNvPr id="13" name="Zone de texte 153"/>
@@ -13366,7 +13372,7 @@
                   </p:txBody>
                 </p:sp>
               </mc:Choice>
-              <mc:Fallback>
+              <mc:Fallback xmlns="">
                 <p:sp>
                   <p:nvSpPr>
                     <p:cNvPr id="13" name="Zone de texte 153"/>
@@ -13409,8 +13415,8 @@
                 </p:sp>
               </mc:Fallback>
             </mc:AlternateContent>
-            <mc:AlternateContent xmlns:mc="http://schemas.openxmlformats.org/markup-compatibility/2006">
-              <mc:Choice xmlns:a14="http://schemas.microsoft.com/office/drawing/2010/main" Requires="a14">
+            <mc:AlternateContent xmlns:mc="http://schemas.openxmlformats.org/markup-compatibility/2006" xmlns:a14="http://schemas.microsoft.com/office/drawing/2010/main">
+              <mc:Choice Requires="a14">
                 <p:sp>
                   <p:nvSpPr>
                     <p:cNvPr id="14" name="Zone de texte 154"/>
@@ -13507,7 +13513,7 @@
                   </p:txBody>
                 </p:sp>
               </mc:Choice>
-              <mc:Fallback>
+              <mc:Fallback xmlns="">
                 <p:sp>
                   <p:nvSpPr>
                     <p:cNvPr id="14" name="Zone de texte 154"/>
@@ -13600,8 +13606,8 @@
               </a:p>
             </p:txBody>
           </p:sp>
-          <mc:AlternateContent xmlns:mc="http://schemas.openxmlformats.org/markup-compatibility/2006">
-            <mc:Choice xmlns:a14="http://schemas.microsoft.com/office/drawing/2010/main" Requires="a14">
+          <mc:AlternateContent xmlns:mc="http://schemas.openxmlformats.org/markup-compatibility/2006" xmlns:a14="http://schemas.microsoft.com/office/drawing/2010/main">
+            <mc:Choice Requires="a14">
               <p:sp>
                 <p:nvSpPr>
                   <p:cNvPr id="20" name="Zone de texte 172"/>
@@ -13702,7 +13708,7 @@
                 </p:txBody>
               </p:sp>
             </mc:Choice>
-            <mc:Fallback>
+            <mc:Fallback xmlns="">
               <p:sp>
                 <p:nvSpPr>
                   <p:cNvPr id="20" name="Zone de texte 172"/>
@@ -13828,6 +13834,1531 @@
     <p:extLst>
       <p:ext uri="{BB962C8B-B14F-4D97-AF65-F5344CB8AC3E}">
         <p14:creationId xmlns:p14="http://schemas.microsoft.com/office/powerpoint/2010/main" val="2494791254"/>
+      </p:ext>
+    </p:extLst>
+  </p:cSld>
+  <p:clrMapOvr>
+    <a:masterClrMapping/>
+  </p:clrMapOvr>
+</p:sld>
+</file>
+
+<file path=ppt/slides/slide5.xml><?xml version="1.0" encoding="utf-8"?>
+<p:sld xmlns:a="http://schemas.openxmlformats.org/drawingml/2006/main" xmlns:r="http://schemas.openxmlformats.org/officeDocument/2006/relationships" xmlns:p="http://schemas.openxmlformats.org/presentationml/2006/main">
+  <p:cSld>
+    <p:spTree>
+      <p:nvGrpSpPr>
+        <p:cNvPr id="1" name=""/>
+        <p:cNvGrpSpPr/>
+        <p:nvPr/>
+      </p:nvGrpSpPr>
+      <p:grpSpPr>
+        <a:xfrm>
+          <a:off x="0" y="0"/>
+          <a:ext cx="0" cy="0"/>
+          <a:chOff x="0" y="0"/>
+          <a:chExt cx="0" cy="0"/>
+        </a:xfrm>
+      </p:grpSpPr>
+      <p:grpSp>
+        <p:nvGrpSpPr>
+          <p:cNvPr id="55" name="Groupe 54"/>
+          <p:cNvGrpSpPr/>
+          <p:nvPr/>
+        </p:nvGrpSpPr>
+        <p:grpSpPr>
+          <a:xfrm>
+            <a:off x="2455040" y="1053713"/>
+            <a:ext cx="6752314" cy="4821552"/>
+            <a:chOff x="2455040" y="1053713"/>
+            <a:chExt cx="6752314" cy="4821552"/>
+          </a:xfrm>
+        </p:grpSpPr>
+        <p:grpSp>
+          <p:nvGrpSpPr>
+            <p:cNvPr id="4" name="Groupe 3"/>
+            <p:cNvGrpSpPr/>
+            <p:nvPr/>
+          </p:nvGrpSpPr>
+          <p:grpSpPr>
+            <a:xfrm>
+              <a:off x="3235826" y="1119187"/>
+              <a:ext cx="5062520" cy="4756078"/>
+              <a:chOff x="790577" y="379448"/>
+              <a:chExt cx="5062520" cy="4756078"/>
+            </a:xfrm>
+          </p:grpSpPr>
+          <p:grpSp>
+            <p:nvGrpSpPr>
+              <p:cNvPr id="5" name="Groupe 4"/>
+              <p:cNvGrpSpPr/>
+              <p:nvPr/>
+            </p:nvGrpSpPr>
+            <p:grpSpPr>
+              <a:xfrm>
+                <a:off x="1295695" y="930855"/>
+                <a:ext cx="3865818" cy="3865818"/>
+                <a:chOff x="1744407" y="1446219"/>
+                <a:chExt cx="3865818" cy="3865818"/>
+              </a:xfrm>
+            </p:grpSpPr>
+            <p:sp>
+              <p:nvSpPr>
+                <p:cNvPr id="15" name="Ellipse 14"/>
+                <p:cNvSpPr/>
+                <p:nvPr/>
+              </p:nvSpPr>
+              <p:spPr>
+                <a:xfrm>
+                  <a:off x="1744407" y="1446219"/>
+                  <a:ext cx="3865818" cy="3865818"/>
+                </a:xfrm>
+                <a:prstGeom prst="ellipse">
+                  <a:avLst/>
+                </a:prstGeom>
+                <a:solidFill>
+                  <a:schemeClr val="bg1">
+                    <a:lumMod val="75000"/>
+                  </a:schemeClr>
+                </a:solidFill>
+                <a:ln w="19050">
+                  <a:solidFill>
+                    <a:schemeClr val="tx1"/>
+                  </a:solidFill>
+                </a:ln>
+              </p:spPr>
+              <p:style>
+                <a:lnRef idx="2">
+                  <a:schemeClr val="accent1">
+                    <a:shade val="50000"/>
+                  </a:schemeClr>
+                </a:lnRef>
+                <a:fillRef idx="1">
+                  <a:schemeClr val="accent1"/>
+                </a:fillRef>
+                <a:effectRef idx="0">
+                  <a:schemeClr val="accent1"/>
+                </a:effectRef>
+                <a:fontRef idx="minor">
+                  <a:schemeClr val="lt1"/>
+                </a:fontRef>
+              </p:style>
+              <p:txBody>
+                <a:bodyPr rtlCol="0" anchor="ctr"/>
+                <a:lstStyle/>
+                <a:p>
+                  <a:pPr algn="ctr"/>
+                  <a:endParaRPr lang="fr-FR"/>
+                </a:p>
+              </p:txBody>
+            </p:sp>
+            <p:sp>
+              <p:nvSpPr>
+                <p:cNvPr id="16" name="Ellipse 15"/>
+                <p:cNvSpPr/>
+                <p:nvPr/>
+              </p:nvSpPr>
+              <p:spPr>
+                <a:xfrm>
+                  <a:off x="1915857" y="1589094"/>
+                  <a:ext cx="3541968" cy="3541968"/>
+                </a:xfrm>
+                <a:prstGeom prst="ellipse">
+                  <a:avLst/>
+                </a:prstGeom>
+                <a:solidFill>
+                  <a:schemeClr val="bg1"/>
+                </a:solidFill>
+                <a:ln w="19050">
+                  <a:solidFill>
+                    <a:schemeClr val="tx1"/>
+                  </a:solidFill>
+                </a:ln>
+              </p:spPr>
+              <p:style>
+                <a:lnRef idx="2">
+                  <a:schemeClr val="accent1">
+                    <a:shade val="50000"/>
+                  </a:schemeClr>
+                </a:lnRef>
+                <a:fillRef idx="1">
+                  <a:schemeClr val="accent1"/>
+                </a:fillRef>
+                <a:effectRef idx="0">
+                  <a:schemeClr val="accent1"/>
+                </a:effectRef>
+                <a:fontRef idx="minor">
+                  <a:schemeClr val="lt1"/>
+                </a:fontRef>
+              </p:style>
+              <p:txBody>
+                <a:bodyPr rtlCol="0" anchor="ctr"/>
+                <a:lstStyle/>
+                <a:p>
+                  <a:pPr algn="ctr"/>
+                  <a:endParaRPr lang="fr-FR"/>
+                </a:p>
+              </p:txBody>
+            </p:sp>
+          </p:grpSp>
+          <p:grpSp>
+            <p:nvGrpSpPr>
+              <p:cNvPr id="6" name="Groupe 5"/>
+              <p:cNvGrpSpPr/>
+              <p:nvPr/>
+            </p:nvGrpSpPr>
+            <p:grpSpPr>
+              <a:xfrm>
+                <a:off x="790577" y="379448"/>
+                <a:ext cx="5062520" cy="4756078"/>
+                <a:chOff x="2943314" y="-133329"/>
+                <a:chExt cx="5062520" cy="4756078"/>
+              </a:xfrm>
+            </p:grpSpPr>
+            <p:grpSp>
+              <p:nvGrpSpPr>
+                <p:cNvPr id="7" name="Groupe 6"/>
+                <p:cNvGrpSpPr/>
+                <p:nvPr/>
+              </p:nvGrpSpPr>
+              <p:grpSpPr>
+                <a:xfrm>
+                  <a:off x="2943314" y="-84152"/>
+                  <a:ext cx="5062520" cy="4706901"/>
+                  <a:chOff x="6005425" y="972635"/>
+                  <a:chExt cx="4096191" cy="4234005"/>
+                </a:xfrm>
+              </p:grpSpPr>
+              <p:grpSp>
+                <p:nvGrpSpPr>
+                  <p:cNvPr id="10" name="Groupe 9"/>
+                  <p:cNvGrpSpPr/>
+                  <p:nvPr/>
+                </p:nvGrpSpPr>
+                <p:grpSpPr>
+                  <a:xfrm>
+                    <a:off x="6005425" y="972635"/>
+                    <a:ext cx="3868851" cy="4189769"/>
+                    <a:chOff x="-937798" y="-983573"/>
+                    <a:chExt cx="3871157" cy="4191934"/>
+                  </a:xfrm>
+                </p:grpSpPr>
+                <p:cxnSp>
+                  <p:nvCxnSpPr>
+                    <p:cNvPr id="13" name="Connecteur droit avec flèche 12"/>
+                    <p:cNvCxnSpPr/>
+                    <p:nvPr/>
+                  </p:nvCxnSpPr>
+                  <p:spPr>
+                    <a:xfrm>
+                      <a:off x="-937798" y="1182414"/>
+                      <a:ext cx="3871157" cy="0"/>
+                    </a:xfrm>
+                    <a:prstGeom prst="straightConnector1">
+                      <a:avLst/>
+                    </a:prstGeom>
+                    <a:ln w="38100">
+                      <a:solidFill>
+                        <a:schemeClr val="tx1"/>
+                      </a:solidFill>
+                      <a:tailEnd type="triangle"/>
+                    </a:ln>
+                  </p:spPr>
+                  <p:style>
+                    <a:lnRef idx="1">
+                      <a:schemeClr val="accent1"/>
+                    </a:lnRef>
+                    <a:fillRef idx="0">
+                      <a:schemeClr val="accent1"/>
+                    </a:fillRef>
+                    <a:effectRef idx="0">
+                      <a:schemeClr val="accent1"/>
+                    </a:effectRef>
+                    <a:fontRef idx="minor">
+                      <a:schemeClr val="tx1"/>
+                    </a:fontRef>
+                  </p:style>
+                </p:cxnSp>
+                <p:cxnSp>
+                  <p:nvCxnSpPr>
+                    <p:cNvPr id="14" name="Connecteur droit avec flèche 13"/>
+                    <p:cNvCxnSpPr/>
+                    <p:nvPr/>
+                  </p:nvCxnSpPr>
+                  <p:spPr>
+                    <a:xfrm>
+                      <a:off x="1052702" y="-983573"/>
+                      <a:ext cx="0" cy="4191934"/>
+                    </a:xfrm>
+                    <a:prstGeom prst="straightConnector1">
+                      <a:avLst/>
+                    </a:prstGeom>
+                    <a:ln w="38100">
+                      <a:solidFill>
+                        <a:schemeClr val="tx1"/>
+                      </a:solidFill>
+                      <a:tailEnd type="triangle"/>
+                    </a:ln>
+                  </p:spPr>
+                  <p:style>
+                    <a:lnRef idx="1">
+                      <a:schemeClr val="accent1"/>
+                    </a:lnRef>
+                    <a:fillRef idx="0">
+                      <a:schemeClr val="accent1"/>
+                    </a:fillRef>
+                    <a:effectRef idx="0">
+                      <a:schemeClr val="accent1"/>
+                    </a:effectRef>
+                    <a:fontRef idx="minor">
+                      <a:schemeClr val="tx1"/>
+                    </a:fontRef>
+                  </p:style>
+                </p:cxnSp>
+              </p:grpSp>
+              <mc:AlternateContent xmlns:mc="http://schemas.openxmlformats.org/markup-compatibility/2006">
+                <mc:Choice xmlns:a14="http://schemas.microsoft.com/office/drawing/2010/main" Requires="a14">
+                  <p:sp>
+                    <p:nvSpPr>
+                      <p:cNvPr id="11" name="Zone de texte 153"/>
+                      <p:cNvSpPr txBox="1"/>
+                      <p:nvPr/>
+                    </p:nvSpPr>
+                    <p:spPr>
+                      <a:xfrm>
+                        <a:off x="7978084" y="4931990"/>
+                        <a:ext cx="301748" cy="274650"/>
+                      </a:xfrm>
+                      <a:prstGeom prst="rect">
+                        <a:avLst/>
+                      </a:prstGeom>
+                      <a:noFill/>
+                      <a:ln w="6350">
+                        <a:noFill/>
+                      </a:ln>
+                      <a:effectLst/>
+                    </p:spPr>
+                    <p:style>
+                      <a:lnRef idx="0">
+                        <a:schemeClr val="accent1"/>
+                      </a:lnRef>
+                      <a:fillRef idx="0">
+                        <a:schemeClr val="accent1"/>
+                      </a:fillRef>
+                      <a:effectRef idx="0">
+                        <a:schemeClr val="accent1"/>
+                      </a:effectRef>
+                      <a:fontRef idx="minor">
+                        <a:schemeClr val="dk1"/>
+                      </a:fontRef>
+                    </p:style>
+                    <p:txBody>
+                      <a:bodyPr rot="0" spcFirstLastPara="0" vert="horz" wrap="square" lIns="91440" tIns="45720" rIns="91440" bIns="45720" numCol="1" spcCol="0" rtlCol="0" fromWordArt="0" anchor="t" anchorCtr="0" forceAA="0" compatLnSpc="1">
+                        <a:prstTxWarp prst="textNoShape">
+                          <a:avLst/>
+                        </a:prstTxWarp>
+                        <a:noAutofit/>
+                      </a:bodyPr>
+                      <a:lstStyle/>
+                      <a:p>
+                        <a:pPr>
+                          <a:lnSpc>
+                            <a:spcPct val="107000"/>
+                          </a:lnSpc>
+                          <a:spcAft>
+                            <a:spcPts val="800"/>
+                          </a:spcAft>
+                        </a:pPr>
+                        <a14:m>
+                          <m:oMathPara xmlns:m="http://schemas.openxmlformats.org/officeDocument/2006/math">
+                            <m:oMathParaPr>
+                              <m:jc m:val="centerGroup"/>
+                            </m:oMathParaPr>
+                            <m:oMath xmlns:m="http://schemas.openxmlformats.org/officeDocument/2006/math">
+                              <m:r>
+                                <a:rPr lang="fr-FR" sz="2400" b="0" i="1" smtClean="0">
+                                  <a:effectLst/>
+                                  <a:latin typeface="Cambria Math" panose="02040503050406030204" pitchFamily="18" charset="0"/>
+                                  <a:ea typeface="Calibri" panose="020F0502020204030204" pitchFamily="34" charset="0"/>
+                                  <a:cs typeface="Times New Roman" panose="02020603050405020304" pitchFamily="18" charset="0"/>
+                                </a:rPr>
+                                <m:t>𝑋</m:t>
+                              </m:r>
+                            </m:oMath>
+                          </m:oMathPara>
+                        </a14:m>
+                        <a:endParaRPr lang="fr-FR" sz="2400" dirty="0">
+                          <a:effectLst/>
+                          <a:ea typeface="Calibri" panose="020F0502020204030204" pitchFamily="34" charset="0"/>
+                          <a:cs typeface="Times New Roman" panose="02020603050405020304" pitchFamily="18" charset="0"/>
+                        </a:endParaRPr>
+                      </a:p>
+                      <a:p>
+                        <a:pPr>
+                          <a:lnSpc>
+                            <a:spcPct val="107000"/>
+                          </a:lnSpc>
+                          <a:spcAft>
+                            <a:spcPts val="800"/>
+                          </a:spcAft>
+                        </a:pPr>
+                        <a:r>
+                          <a:rPr lang="fr-FR" sz="2400" dirty="0">
+                            <a:effectLst/>
+                            <a:ea typeface="Calibri" panose="020F0502020204030204" pitchFamily="34" charset="0"/>
+                            <a:cs typeface="Times New Roman" panose="02020603050405020304" pitchFamily="18" charset="0"/>
+                          </a:rPr>
+                          <a:t> </a:t>
+                        </a:r>
+                      </a:p>
+                    </p:txBody>
+                  </p:sp>
+                </mc:Choice>
+                <mc:Fallback>
+                  <p:sp>
+                    <p:nvSpPr>
+                      <p:cNvPr id="11" name="Zone de texte 153"/>
+                      <p:cNvSpPr txBox="1">
+                        <a:spLocks noRot="1" noChangeAspect="1" noMove="1" noResize="1" noEditPoints="1" noAdjustHandles="1" noChangeArrowheads="1" noChangeShapeType="1" noTextEdit="1"/>
+                      </p:cNvSpPr>
+                      <p:nvPr/>
+                    </p:nvSpPr>
+                    <p:spPr>
+                      <a:xfrm>
+                        <a:off x="7978084" y="4931990"/>
+                        <a:ext cx="301748" cy="274650"/>
+                      </a:xfrm>
+                      <a:prstGeom prst="rect">
+                        <a:avLst/>
+                      </a:prstGeom>
+                      <a:blipFill rotWithShape="0">
+                        <a:blip r:embed="rId2"/>
+                        <a:stretch>
+                          <a:fillRect b="-12000"/>
+                        </a:stretch>
+                      </a:blipFill>
+                      <a:ln w="6350">
+                        <a:noFill/>
+                      </a:ln>
+                      <a:effectLst/>
+                    </p:spPr>
+                    <p:txBody>
+                      <a:bodyPr/>
+                      <a:lstStyle/>
+                      <a:p>
+                        <a:r>
+                          <a:rPr lang="fr-FR">
+                            <a:noFill/>
+                          </a:rPr>
+                          <a:t> </a:t>
+                        </a:r>
+                      </a:p>
+                    </p:txBody>
+                  </p:sp>
+                </mc:Fallback>
+              </mc:AlternateContent>
+              <mc:AlternateContent xmlns:mc="http://schemas.openxmlformats.org/markup-compatibility/2006">
+                <mc:Choice xmlns:a14="http://schemas.microsoft.com/office/drawing/2010/main" Requires="a14">
+                  <p:sp>
+                    <p:nvSpPr>
+                      <p:cNvPr id="12" name="Zone de texte 154"/>
+                      <p:cNvSpPr txBox="1"/>
+                      <p:nvPr/>
+                    </p:nvSpPr>
+                    <p:spPr>
+                      <a:xfrm>
+                        <a:off x="9799868" y="2749962"/>
+                        <a:ext cx="301748" cy="274650"/>
+                      </a:xfrm>
+                      <a:prstGeom prst="rect">
+                        <a:avLst/>
+                      </a:prstGeom>
+                      <a:noFill/>
+                      <a:ln w="6350">
+                        <a:noFill/>
+                      </a:ln>
+                      <a:effectLst/>
+                    </p:spPr>
+                    <p:style>
+                      <a:lnRef idx="0">
+                        <a:schemeClr val="accent1"/>
+                      </a:lnRef>
+                      <a:fillRef idx="0">
+                        <a:schemeClr val="accent1"/>
+                      </a:fillRef>
+                      <a:effectRef idx="0">
+                        <a:schemeClr val="accent1"/>
+                      </a:effectRef>
+                      <a:fontRef idx="minor">
+                        <a:schemeClr val="dk1"/>
+                      </a:fontRef>
+                    </p:style>
+                    <p:txBody>
+                      <a:bodyPr rot="0" spcFirstLastPara="0" vert="horz" wrap="square" lIns="91440" tIns="45720" rIns="91440" bIns="45720" numCol="1" spcCol="0" rtlCol="0" fromWordArt="0" anchor="t" anchorCtr="0" forceAA="0" compatLnSpc="1">
+                        <a:prstTxWarp prst="textNoShape">
+                          <a:avLst/>
+                        </a:prstTxWarp>
+                        <a:noAutofit/>
+                      </a:bodyPr>
+                      <a:lstStyle/>
+                      <a:p>
+                        <a:pPr>
+                          <a:lnSpc>
+                            <a:spcPct val="107000"/>
+                          </a:lnSpc>
+                          <a:spcAft>
+                            <a:spcPts val="800"/>
+                          </a:spcAft>
+                        </a:pPr>
+                        <a14:m>
+                          <m:oMathPara xmlns:m="http://schemas.openxmlformats.org/officeDocument/2006/math">
+                            <m:oMathParaPr>
+                              <m:jc m:val="centerGroup"/>
+                            </m:oMathParaPr>
+                            <m:oMath xmlns:m="http://schemas.openxmlformats.org/officeDocument/2006/math">
+                              <m:r>
+                                <a:rPr lang="fr-FR" sz="2400" b="0" i="1" smtClean="0">
+                                  <a:effectLst/>
+                                  <a:latin typeface="Cambria Math" panose="02040503050406030204" pitchFamily="18" charset="0"/>
+                                  <a:ea typeface="Calibri" panose="020F0502020204030204" pitchFamily="34" charset="0"/>
+                                  <a:cs typeface="Times New Roman" panose="02020603050405020304" pitchFamily="18" charset="0"/>
+                                </a:rPr>
+                                <m:t>𝑌</m:t>
+                              </m:r>
+                            </m:oMath>
+                          </m:oMathPara>
+                        </a14:m>
+                        <a:endParaRPr lang="fr-FR" sz="2400" dirty="0">
+                          <a:effectLst/>
+                          <a:ea typeface="Calibri" panose="020F0502020204030204" pitchFamily="34" charset="0"/>
+                          <a:cs typeface="Times New Roman" panose="02020603050405020304" pitchFamily="18" charset="0"/>
+                        </a:endParaRPr>
+                      </a:p>
+                      <a:p>
+                        <a:pPr>
+                          <a:lnSpc>
+                            <a:spcPct val="107000"/>
+                          </a:lnSpc>
+                          <a:spcAft>
+                            <a:spcPts val="800"/>
+                          </a:spcAft>
+                        </a:pPr>
+                        <a:r>
+                          <a:rPr lang="fr-FR" sz="2400" dirty="0">
+                            <a:effectLst/>
+                            <a:ea typeface="Calibri" panose="020F0502020204030204" pitchFamily="34" charset="0"/>
+                            <a:cs typeface="Times New Roman" panose="02020603050405020304" pitchFamily="18" charset="0"/>
+                          </a:rPr>
+                          <a:t> </a:t>
+                        </a:r>
+                      </a:p>
+                    </p:txBody>
+                  </p:sp>
+                </mc:Choice>
+                <mc:Fallback>
+                  <p:sp>
+                    <p:nvSpPr>
+                      <p:cNvPr id="12" name="Zone de texte 154"/>
+                      <p:cNvSpPr txBox="1">
+                        <a:spLocks noRot="1" noChangeAspect="1" noMove="1" noResize="1" noEditPoints="1" noAdjustHandles="1" noChangeArrowheads="1" noChangeShapeType="1" noTextEdit="1"/>
+                      </p:cNvSpPr>
+                      <p:nvPr/>
+                    </p:nvSpPr>
+                    <p:spPr>
+                      <a:xfrm>
+                        <a:off x="9799868" y="2749962"/>
+                        <a:ext cx="301748" cy="274650"/>
+                      </a:xfrm>
+                      <a:prstGeom prst="rect">
+                        <a:avLst/>
+                      </a:prstGeom>
+                      <a:blipFill rotWithShape="0">
+                        <a:blip r:embed="rId3"/>
+                        <a:stretch>
+                          <a:fillRect b="-12000"/>
+                        </a:stretch>
+                      </a:blipFill>
+                      <a:ln w="6350">
+                        <a:noFill/>
+                      </a:ln>
+                      <a:effectLst/>
+                    </p:spPr>
+                    <p:txBody>
+                      <a:bodyPr/>
+                      <a:lstStyle/>
+                      <a:p>
+                        <a:r>
+                          <a:rPr lang="fr-FR">
+                            <a:noFill/>
+                          </a:rPr>
+                          <a:t> </a:t>
+                        </a:r>
+                      </a:p>
+                    </p:txBody>
+                  </p:sp>
+                </mc:Fallback>
+              </mc:AlternateContent>
+            </p:grpSp>
+            <p:sp>
+              <p:nvSpPr>
+                <p:cNvPr id="8" name="Arc 7"/>
+                <p:cNvSpPr/>
+                <p:nvPr/>
+              </p:nvSpPr>
+              <p:spPr>
+                <a:xfrm rot="13411610">
+                  <a:off x="4701168" y="97926"/>
+                  <a:ext cx="962471" cy="1002521"/>
+                </a:xfrm>
+                <a:prstGeom prst="arc">
+                  <a:avLst>
+                    <a:gd name="adj1" fmla="val 21020445"/>
+                    <a:gd name="adj2" fmla="val 4480889"/>
+                  </a:avLst>
+                </a:prstGeom>
+                <a:ln>
+                  <a:prstDash val="solid"/>
+                  <a:headEnd type="triangle"/>
+                </a:ln>
+              </p:spPr>
+              <p:style>
+                <a:lnRef idx="3">
+                  <a:schemeClr val="dk1"/>
+                </a:lnRef>
+                <a:fillRef idx="0">
+                  <a:schemeClr val="dk1"/>
+                </a:fillRef>
+                <a:effectRef idx="2">
+                  <a:schemeClr val="dk1"/>
+                </a:effectRef>
+                <a:fontRef idx="minor">
+                  <a:schemeClr val="tx1"/>
+                </a:fontRef>
+              </p:style>
+              <p:txBody>
+                <a:bodyPr rot="0" spcFirstLastPara="0" vert="horz" wrap="square" lIns="91440" tIns="45720" rIns="91440" bIns="45720" numCol="1" spcCol="0" rtlCol="0" fromWordArt="0" anchor="ctr" anchorCtr="0" forceAA="0" compatLnSpc="1">
+                  <a:prstTxWarp prst="textNoShape">
+                    <a:avLst/>
+                  </a:prstTxWarp>
+                  <a:noAutofit/>
+                </a:bodyPr>
+                <a:lstStyle/>
+                <a:p>
+                  <a:endParaRPr lang="fr-FR" sz="4000"/>
+                </a:p>
+              </p:txBody>
+            </p:sp>
+            <mc:AlternateContent xmlns:mc="http://schemas.openxmlformats.org/markup-compatibility/2006" xmlns:a14="http://schemas.microsoft.com/office/drawing/2010/main">
+              <mc:Choice Requires="a14">
+                <p:sp>
+                  <p:nvSpPr>
+                    <p:cNvPr id="9" name="Zone de texte 172"/>
+                    <p:cNvSpPr txBox="1"/>
+                    <p:nvPr/>
+                  </p:nvSpPr>
+                  <p:spPr>
+                    <a:xfrm>
+                      <a:off x="4535910" y="-133329"/>
+                      <a:ext cx="290213" cy="370432"/>
+                    </a:xfrm>
+                    <a:prstGeom prst="rect">
+                      <a:avLst/>
+                    </a:prstGeom>
+                    <a:noFill/>
+                    <a:ln w="6350">
+                      <a:noFill/>
+                    </a:ln>
+                    <a:effectLst/>
+                  </p:spPr>
+                  <p:style>
+                    <a:lnRef idx="0">
+                      <a:schemeClr val="accent1"/>
+                    </a:lnRef>
+                    <a:fillRef idx="0">
+                      <a:schemeClr val="accent1"/>
+                    </a:fillRef>
+                    <a:effectRef idx="0">
+                      <a:schemeClr val="accent1"/>
+                    </a:effectRef>
+                    <a:fontRef idx="minor">
+                      <a:schemeClr val="dk1"/>
+                    </a:fontRef>
+                  </p:style>
+                  <p:txBody>
+                    <a:bodyPr rot="0" spcFirstLastPara="0" vert="horz" wrap="square" lIns="91440" tIns="45720" rIns="91440" bIns="45720" numCol="1" spcCol="0" rtlCol="0" fromWordArt="0" anchor="t" anchorCtr="0" forceAA="0" compatLnSpc="1">
+                      <a:prstTxWarp prst="textNoShape">
+                        <a:avLst/>
+                      </a:prstTxWarp>
+                      <a:noAutofit/>
+                    </a:bodyPr>
+                    <a:lstStyle/>
+                    <a:p>
+                      <a:pPr>
+                        <a:lnSpc>
+                          <a:spcPct val="107000"/>
+                        </a:lnSpc>
+                        <a:spcAft>
+                          <a:spcPts val="800"/>
+                        </a:spcAft>
+                      </a:pPr>
+                      <a14:m>
+                        <m:oMathPara xmlns:m="http://schemas.openxmlformats.org/officeDocument/2006/math">
+                          <m:oMathParaPr>
+                            <m:jc m:val="centerGroup"/>
+                          </m:oMathParaPr>
+                          <m:oMath xmlns:m="http://schemas.openxmlformats.org/officeDocument/2006/math">
+                            <m:sSup>
+                              <m:sSupPr>
+                                <m:ctrlPr>
+                                  <a:rPr lang="fr-FR" sz="2400" b="0" i="1" smtClean="0">
+                                    <a:latin typeface="Cambria Math" panose="02040503050406030204" pitchFamily="18" charset="0"/>
+                                    <a:ea typeface="Calibri" panose="020F0502020204030204" pitchFamily="34" charset="0"/>
+                                    <a:cs typeface="Times New Roman" panose="02020603050405020304" pitchFamily="18" charset="0"/>
+                                  </a:rPr>
+                                </m:ctrlPr>
+                              </m:sSupPr>
+                              <m:e>
+                                <m:r>
+                                  <a:rPr lang="fr-FR" sz="2400" i="1" smtClean="0">
+                                    <a:latin typeface="Cambria Math" panose="02040503050406030204" pitchFamily="18" charset="0"/>
+                                    <a:ea typeface="Calibri" panose="020F0502020204030204" pitchFamily="34" charset="0"/>
+                                    <a:cs typeface="Times New Roman" panose="02020603050405020304" pitchFamily="18" charset="0"/>
+                                  </a:rPr>
+                                  <m:t>𝜃</m:t>
+                                </m:r>
+                              </m:e>
+                              <m:sup>
+                                <m:r>
+                                  <a:rPr lang="fr-FR" sz="2400" b="0" i="1" smtClean="0">
+                                    <a:latin typeface="Cambria Math" panose="02040503050406030204" pitchFamily="18" charset="0"/>
+                                    <a:ea typeface="Calibri" panose="020F0502020204030204" pitchFamily="34" charset="0"/>
+                                    <a:cs typeface="Times New Roman" panose="02020603050405020304" pitchFamily="18" charset="0"/>
+                                  </a:rPr>
+                                  <m:t>∗</m:t>
+                                </m:r>
+                              </m:sup>
+                            </m:sSup>
+                          </m:oMath>
+                        </m:oMathPara>
+                      </a14:m>
+                      <a:endParaRPr lang="fr-FR" sz="2400" dirty="0">
+                        <a:effectLst/>
+                        <a:ea typeface="Calibri" panose="020F0502020204030204" pitchFamily="34" charset="0"/>
+                        <a:cs typeface="Times New Roman" panose="02020603050405020304" pitchFamily="18" charset="0"/>
+                      </a:endParaRPr>
+                    </a:p>
+                  </p:txBody>
+                </p:sp>
+              </mc:Choice>
+              <mc:Fallback xmlns="">
+                <p:sp>
+                  <p:nvSpPr>
+                    <p:cNvPr id="20" name="Zone de texte 172"/>
+                    <p:cNvSpPr txBox="1">
+                      <a:spLocks noRot="1" noChangeAspect="1" noMove="1" noResize="1" noEditPoints="1" noAdjustHandles="1" noChangeArrowheads="1" noChangeShapeType="1" noTextEdit="1"/>
+                    </p:cNvSpPr>
+                    <p:nvPr/>
+                  </p:nvSpPr>
+                  <p:spPr>
+                    <a:xfrm>
+                      <a:off x="4535910" y="-133329"/>
+                      <a:ext cx="290213" cy="370432"/>
+                    </a:xfrm>
+                    <a:prstGeom prst="rect">
+                      <a:avLst/>
+                    </a:prstGeom>
+                    <a:blipFill rotWithShape="0">
+                      <a:blip r:embed="rId4"/>
+                      <a:stretch>
+                        <a:fillRect r="-29167"/>
+                      </a:stretch>
+                    </a:blipFill>
+                    <a:ln w="6350">
+                      <a:noFill/>
+                    </a:ln>
+                    <a:effectLst/>
+                  </p:spPr>
+                  <p:txBody>
+                    <a:bodyPr/>
+                    <a:lstStyle/>
+                    <a:p>
+                      <a:r>
+                        <a:rPr lang="fr-FR">
+                          <a:noFill/>
+                        </a:rPr>
+                        <a:t> </a:t>
+                      </a:r>
+                    </a:p>
+                  </p:txBody>
+                </p:sp>
+              </mc:Fallback>
+            </mc:AlternateContent>
+          </p:grpSp>
+        </p:grpSp>
+        <p:sp>
+          <p:nvSpPr>
+            <p:cNvPr id="17" name="ZoneTexte 16"/>
+            <p:cNvSpPr txBox="1"/>
+            <p:nvPr/>
+          </p:nvSpPr>
+          <p:spPr>
+            <a:xfrm>
+              <a:off x="7807675" y="1053713"/>
+              <a:ext cx="1399679" cy="461665"/>
+            </a:xfrm>
+            <a:prstGeom prst="rect">
+              <a:avLst/>
+            </a:prstGeom>
+            <a:noFill/>
+          </p:spPr>
+          <p:txBody>
+            <a:bodyPr wrap="none" rtlCol="0">
+              <a:spAutoFit/>
+            </a:bodyPr>
+            <a:lstStyle/>
+            <a:p>
+              <a:r>
+                <a:rPr lang="fr-FR" sz="2400" dirty="0" smtClean="0"/>
+                <a:t>Coussinet</a:t>
+              </a:r>
+              <a:endParaRPr lang="fr-FR" sz="2400" dirty="0"/>
+            </a:p>
+          </p:txBody>
+        </p:sp>
+        <p:cxnSp>
+          <p:nvCxnSpPr>
+            <p:cNvPr id="19" name="Connecteur en arc 18"/>
+            <p:cNvCxnSpPr>
+              <a:stCxn id="17" idx="1"/>
+              <a:endCxn id="15" idx="7"/>
+            </p:cNvCxnSpPr>
+            <p:nvPr/>
+          </p:nvCxnSpPr>
+          <p:spPr>
+            <a:xfrm rot="10800000" flipV="1">
+              <a:off x="7040627" y="1284546"/>
+              <a:ext cx="767049" cy="952184"/>
+            </a:xfrm>
+            <a:prstGeom prst="curvedConnector2">
+              <a:avLst/>
+            </a:prstGeom>
+            <a:ln w="28575">
+              <a:solidFill>
+                <a:schemeClr val="tx1"/>
+              </a:solidFill>
+              <a:tailEnd type="triangle"/>
+            </a:ln>
+          </p:spPr>
+          <p:style>
+            <a:lnRef idx="1">
+              <a:schemeClr val="accent1"/>
+            </a:lnRef>
+            <a:fillRef idx="0">
+              <a:schemeClr val="accent1"/>
+            </a:fillRef>
+            <a:effectRef idx="0">
+              <a:schemeClr val="accent1"/>
+            </a:effectRef>
+            <a:fontRef idx="minor">
+              <a:schemeClr val="tx1"/>
+            </a:fontRef>
+          </p:style>
+        </p:cxnSp>
+        <p:sp>
+          <p:nvSpPr>
+            <p:cNvPr id="22" name="ZoneTexte 21"/>
+            <p:cNvSpPr txBox="1"/>
+            <p:nvPr/>
+          </p:nvSpPr>
+          <p:spPr>
+            <a:xfrm>
+              <a:off x="2455040" y="1798657"/>
+              <a:ext cx="931792" cy="461665"/>
+            </a:xfrm>
+            <a:prstGeom prst="rect">
+              <a:avLst/>
+            </a:prstGeom>
+            <a:noFill/>
+          </p:spPr>
+          <p:txBody>
+            <a:bodyPr wrap="square" rtlCol="0">
+              <a:spAutoFit/>
+            </a:bodyPr>
+            <a:lstStyle/>
+            <a:p>
+              <a:pPr algn="ctr"/>
+              <a:r>
+                <a:rPr lang="fr-FR" sz="2400" dirty="0" smtClean="0">
+                  <a:solidFill>
+                    <a:srgbClr val="0070C0"/>
+                  </a:solidFill>
+                </a:rPr>
+                <a:t>Rotor</a:t>
+              </a:r>
+              <a:endParaRPr lang="fr-FR" sz="1400" dirty="0">
+                <a:solidFill>
+                  <a:srgbClr val="0070C0"/>
+                </a:solidFill>
+              </a:endParaRPr>
+            </a:p>
+          </p:txBody>
+        </p:sp>
+        <p:cxnSp>
+          <p:nvCxnSpPr>
+            <p:cNvPr id="23" name="Connecteur en arc 22"/>
+            <p:cNvCxnSpPr>
+              <a:stCxn id="22" idx="3"/>
+              <a:endCxn id="21" idx="1"/>
+            </p:cNvCxnSpPr>
+            <p:nvPr/>
+          </p:nvCxnSpPr>
+          <p:spPr>
+            <a:xfrm>
+              <a:off x="3386832" y="2029490"/>
+              <a:ext cx="1563697" cy="791288"/>
+            </a:xfrm>
+            <a:prstGeom prst="curvedConnector2">
+              <a:avLst/>
+            </a:prstGeom>
+            <a:ln w="28575">
+              <a:solidFill>
+                <a:srgbClr val="0070C0"/>
+              </a:solidFill>
+              <a:tailEnd type="triangle"/>
+            </a:ln>
+          </p:spPr>
+          <p:style>
+            <a:lnRef idx="1">
+              <a:schemeClr val="accent1"/>
+            </a:lnRef>
+            <a:fillRef idx="0">
+              <a:schemeClr val="accent1"/>
+            </a:fillRef>
+            <a:effectRef idx="0">
+              <a:schemeClr val="accent1"/>
+            </a:effectRef>
+            <a:fontRef idx="minor">
+              <a:schemeClr val="tx1"/>
+            </a:fontRef>
+          </p:style>
+        </p:cxnSp>
+        <p:grpSp>
+          <p:nvGrpSpPr>
+            <p:cNvPr id="44" name="Groupe 43"/>
+            <p:cNvGrpSpPr/>
+            <p:nvPr/>
+          </p:nvGrpSpPr>
+          <p:grpSpPr>
+            <a:xfrm>
+              <a:off x="4634204" y="1770062"/>
+              <a:ext cx="3100330" cy="3481819"/>
+              <a:chOff x="2543007" y="1257901"/>
+              <a:chExt cx="3100330" cy="3481819"/>
+            </a:xfrm>
+          </p:grpSpPr>
+          <p:sp>
+            <p:nvSpPr>
+              <p:cNvPr id="21" name="Ellipse 20"/>
+              <p:cNvSpPr/>
+              <p:nvPr/>
+            </p:nvSpPr>
+            <p:spPr>
+              <a:xfrm>
+                <a:off x="2543007" y="1992292"/>
+                <a:ext cx="2160000" cy="2160000"/>
+              </a:xfrm>
+              <a:prstGeom prst="ellipse">
+                <a:avLst/>
+              </a:prstGeom>
+              <a:noFill/>
+              <a:ln w="38100">
+                <a:solidFill>
+                  <a:srgbClr val="0070C0"/>
+                </a:solidFill>
+              </a:ln>
+            </p:spPr>
+            <p:style>
+              <a:lnRef idx="2">
+                <a:schemeClr val="accent1">
+                  <a:shade val="50000"/>
+                </a:schemeClr>
+              </a:lnRef>
+              <a:fillRef idx="1">
+                <a:schemeClr val="accent1"/>
+              </a:fillRef>
+              <a:effectRef idx="0">
+                <a:schemeClr val="accent1"/>
+              </a:effectRef>
+              <a:fontRef idx="minor">
+                <a:schemeClr val="lt1"/>
+              </a:fontRef>
+            </p:style>
+            <p:txBody>
+              <a:bodyPr rtlCol="0" anchor="ctr"/>
+              <a:lstStyle/>
+              <a:p>
+                <a:pPr algn="ctr"/>
+                <a:endParaRPr lang="fr-FR"/>
+              </a:p>
+            </p:txBody>
+          </p:sp>
+          <p:grpSp>
+            <p:nvGrpSpPr>
+              <p:cNvPr id="41" name="Groupe 40"/>
+              <p:cNvGrpSpPr/>
+              <p:nvPr/>
+            </p:nvGrpSpPr>
+            <p:grpSpPr>
+              <a:xfrm>
+                <a:off x="3601537" y="1561672"/>
+                <a:ext cx="1675177" cy="3111875"/>
+                <a:chOff x="3601537" y="1561672"/>
+                <a:chExt cx="1675177" cy="3111875"/>
+              </a:xfrm>
+            </p:grpSpPr>
+            <p:cxnSp>
+              <p:nvCxnSpPr>
+                <p:cNvPr id="34" name="Connecteur droit avec flèche 33"/>
+                <p:cNvCxnSpPr/>
+                <p:nvPr/>
+              </p:nvCxnSpPr>
+              <p:spPr>
+                <a:xfrm>
+                  <a:off x="3601537" y="3047038"/>
+                  <a:ext cx="1527646" cy="1626509"/>
+                </a:xfrm>
+                <a:prstGeom prst="straightConnector1">
+                  <a:avLst/>
+                </a:prstGeom>
+                <a:ln w="38100">
+                  <a:solidFill>
+                    <a:srgbClr val="0070C0"/>
+                  </a:solidFill>
+                  <a:tailEnd type="triangle"/>
+                </a:ln>
+              </p:spPr>
+              <p:style>
+                <a:lnRef idx="1">
+                  <a:schemeClr val="accent1"/>
+                </a:lnRef>
+                <a:fillRef idx="0">
+                  <a:schemeClr val="accent1"/>
+                </a:fillRef>
+                <a:effectRef idx="0">
+                  <a:schemeClr val="accent1"/>
+                </a:effectRef>
+                <a:fontRef idx="minor">
+                  <a:schemeClr val="tx1"/>
+                </a:fontRef>
+              </p:style>
+            </p:cxnSp>
+            <p:cxnSp>
+              <p:nvCxnSpPr>
+                <p:cNvPr id="35" name="Connecteur droit avec flèche 34"/>
+                <p:cNvCxnSpPr/>
+                <p:nvPr/>
+              </p:nvCxnSpPr>
+              <p:spPr>
+                <a:xfrm flipV="1">
+                  <a:off x="3623007" y="1561672"/>
+                  <a:ext cx="1653707" cy="1499848"/>
+                </a:xfrm>
+                <a:prstGeom prst="straightConnector1">
+                  <a:avLst/>
+                </a:prstGeom>
+                <a:ln w="38100">
+                  <a:solidFill>
+                    <a:srgbClr val="0070C0"/>
+                  </a:solidFill>
+                  <a:tailEnd type="triangle"/>
+                </a:ln>
+              </p:spPr>
+              <p:style>
+                <a:lnRef idx="1">
+                  <a:schemeClr val="accent1"/>
+                </a:lnRef>
+                <a:fillRef idx="0">
+                  <a:schemeClr val="accent1"/>
+                </a:fillRef>
+                <a:effectRef idx="0">
+                  <a:schemeClr val="accent1"/>
+                </a:effectRef>
+                <a:fontRef idx="minor">
+                  <a:schemeClr val="tx1"/>
+                </a:fontRef>
+              </p:style>
+            </p:cxnSp>
+          </p:grpSp>
+          <mc:AlternateContent xmlns:mc="http://schemas.openxmlformats.org/markup-compatibility/2006">
+            <mc:Choice xmlns:a14="http://schemas.microsoft.com/office/drawing/2010/main" Requires="a14">
+              <p:sp>
+                <p:nvSpPr>
+                  <p:cNvPr id="42" name="Zone de texte 153"/>
+                  <p:cNvSpPr txBox="1"/>
+                  <p:nvPr/>
+                </p:nvSpPr>
+                <p:spPr>
+                  <a:xfrm>
+                    <a:off x="5090247" y="4434394"/>
+                    <a:ext cx="372933" cy="305326"/>
+                  </a:xfrm>
+                  <a:prstGeom prst="rect">
+                    <a:avLst/>
+                  </a:prstGeom>
+                  <a:noFill/>
+                  <a:ln w="6350">
+                    <a:noFill/>
+                  </a:ln>
+                  <a:effectLst/>
+                </p:spPr>
+                <p:style>
+                  <a:lnRef idx="0">
+                    <a:schemeClr val="accent1"/>
+                  </a:lnRef>
+                  <a:fillRef idx="0">
+                    <a:schemeClr val="accent1"/>
+                  </a:fillRef>
+                  <a:effectRef idx="0">
+                    <a:schemeClr val="accent1"/>
+                  </a:effectRef>
+                  <a:fontRef idx="minor">
+                    <a:schemeClr val="dk1"/>
+                  </a:fontRef>
+                </p:style>
+                <p:txBody>
+                  <a:bodyPr rot="0" spcFirstLastPara="0" vert="horz" wrap="square" lIns="91440" tIns="45720" rIns="91440" bIns="45720" numCol="1" spcCol="0" rtlCol="0" fromWordArt="0" anchor="t" anchorCtr="0" forceAA="0" compatLnSpc="1">
+                    <a:prstTxWarp prst="textNoShape">
+                      <a:avLst/>
+                    </a:prstTxWarp>
+                    <a:noAutofit/>
+                  </a:bodyPr>
+                  <a:lstStyle/>
+                  <a:p>
+                    <a:pPr>
+                      <a:lnSpc>
+                        <a:spcPct val="107000"/>
+                      </a:lnSpc>
+                      <a:spcAft>
+                        <a:spcPts val="800"/>
+                      </a:spcAft>
+                    </a:pPr>
+                    <a14:m>
+                      <m:oMathPara xmlns:m="http://schemas.openxmlformats.org/officeDocument/2006/math">
+                        <m:oMathParaPr>
+                          <m:jc m:val="centerGroup"/>
+                        </m:oMathParaPr>
+                        <m:oMath xmlns:m="http://schemas.openxmlformats.org/officeDocument/2006/math">
+                          <m:r>
+                            <a:rPr lang="fr-FR" sz="2400" b="0" i="1" smtClean="0">
+                              <a:solidFill>
+                                <a:srgbClr val="0070C0"/>
+                              </a:solidFill>
+                              <a:effectLst/>
+                              <a:latin typeface="Cambria Math" panose="02040503050406030204" pitchFamily="18" charset="0"/>
+                              <a:ea typeface="Calibri" panose="020F0502020204030204" pitchFamily="34" charset="0"/>
+                              <a:cs typeface="Times New Roman" panose="02020603050405020304" pitchFamily="18" charset="0"/>
+                            </a:rPr>
+                            <m:t>𝑟</m:t>
+                          </m:r>
+                        </m:oMath>
+                      </m:oMathPara>
+                    </a14:m>
+                    <a:endParaRPr lang="fr-FR" sz="2400" dirty="0">
+                      <a:solidFill>
+                        <a:srgbClr val="0070C0"/>
+                      </a:solidFill>
+                      <a:effectLst/>
+                      <a:ea typeface="Calibri" panose="020F0502020204030204" pitchFamily="34" charset="0"/>
+                      <a:cs typeface="Times New Roman" panose="02020603050405020304" pitchFamily="18" charset="0"/>
+                    </a:endParaRPr>
+                  </a:p>
+                  <a:p>
+                    <a:pPr>
+                      <a:lnSpc>
+                        <a:spcPct val="107000"/>
+                      </a:lnSpc>
+                      <a:spcAft>
+                        <a:spcPts val="800"/>
+                      </a:spcAft>
+                    </a:pPr>
+                    <a:r>
+                      <a:rPr lang="fr-FR" sz="2400" dirty="0">
+                        <a:effectLst/>
+                        <a:ea typeface="Calibri" panose="020F0502020204030204" pitchFamily="34" charset="0"/>
+                        <a:cs typeface="Times New Roman" panose="02020603050405020304" pitchFamily="18" charset="0"/>
+                      </a:rPr>
+                      <a:t> </a:t>
+                    </a:r>
+                  </a:p>
+                </p:txBody>
+              </p:sp>
+            </mc:Choice>
+            <mc:Fallback>
+              <p:sp>
+                <p:nvSpPr>
+                  <p:cNvPr id="42" name="Zone de texte 153"/>
+                  <p:cNvSpPr txBox="1">
+                    <a:spLocks noRot="1" noChangeAspect="1" noMove="1" noResize="1" noEditPoints="1" noAdjustHandles="1" noChangeArrowheads="1" noChangeShapeType="1" noTextEdit="1"/>
+                  </p:cNvSpPr>
+                  <p:nvPr/>
+                </p:nvSpPr>
+                <p:spPr>
+                  <a:xfrm>
+                    <a:off x="5090247" y="4434394"/>
+                    <a:ext cx="372933" cy="305326"/>
+                  </a:xfrm>
+                  <a:prstGeom prst="rect">
+                    <a:avLst/>
+                  </a:prstGeom>
+                  <a:blipFill rotWithShape="0">
+                    <a:blip r:embed="rId5"/>
+                    <a:stretch>
+                      <a:fillRect b="-9804"/>
+                    </a:stretch>
+                  </a:blipFill>
+                  <a:ln w="6350">
+                    <a:noFill/>
+                  </a:ln>
+                  <a:effectLst/>
+                </p:spPr>
+                <p:txBody>
+                  <a:bodyPr/>
+                  <a:lstStyle/>
+                  <a:p>
+                    <a:r>
+                      <a:rPr lang="fr-FR">
+                        <a:noFill/>
+                      </a:rPr>
+                      <a:t> </a:t>
+                    </a:r>
+                  </a:p>
+                </p:txBody>
+              </p:sp>
+            </mc:Fallback>
+          </mc:AlternateContent>
+          <mc:AlternateContent xmlns:mc="http://schemas.openxmlformats.org/markup-compatibility/2006">
+            <mc:Choice xmlns:a14="http://schemas.microsoft.com/office/drawing/2010/main" Requires="a14">
+              <p:sp>
+                <p:nvSpPr>
+                  <p:cNvPr id="43" name="Zone de texte 153"/>
+                  <p:cNvSpPr txBox="1"/>
+                  <p:nvPr/>
+                </p:nvSpPr>
+                <p:spPr>
+                  <a:xfrm>
+                    <a:off x="5197371" y="1257901"/>
+                    <a:ext cx="445966" cy="485203"/>
+                  </a:xfrm>
+                  <a:prstGeom prst="rect">
+                    <a:avLst/>
+                  </a:prstGeom>
+                  <a:noFill/>
+                  <a:ln w="6350">
+                    <a:noFill/>
+                  </a:ln>
+                  <a:effectLst/>
+                </p:spPr>
+                <p:style>
+                  <a:lnRef idx="0">
+                    <a:schemeClr val="accent1"/>
+                  </a:lnRef>
+                  <a:fillRef idx="0">
+                    <a:schemeClr val="accent1"/>
+                  </a:fillRef>
+                  <a:effectRef idx="0">
+                    <a:schemeClr val="accent1"/>
+                  </a:effectRef>
+                  <a:fontRef idx="minor">
+                    <a:schemeClr val="dk1"/>
+                  </a:fontRef>
+                </p:style>
+                <p:txBody>
+                  <a:bodyPr rot="0" spcFirstLastPara="0" vert="horz" wrap="square" lIns="91440" tIns="45720" rIns="91440" bIns="45720" numCol="1" spcCol="0" rtlCol="0" fromWordArt="0" anchor="t" anchorCtr="0" forceAA="0" compatLnSpc="1">
+                    <a:prstTxWarp prst="textNoShape">
+                      <a:avLst/>
+                    </a:prstTxWarp>
+                    <a:noAutofit/>
+                  </a:bodyPr>
+                  <a:lstStyle/>
+                  <a:p>
+                    <a:pPr>
+                      <a:lnSpc>
+                        <a:spcPct val="107000"/>
+                      </a:lnSpc>
+                      <a:spcAft>
+                        <a:spcPts val="800"/>
+                      </a:spcAft>
+                    </a:pPr>
+                    <a14:m>
+                      <m:oMathPara xmlns:m="http://schemas.openxmlformats.org/officeDocument/2006/math">
+                        <m:oMathParaPr>
+                          <m:jc m:val="centerGroup"/>
+                        </m:oMathParaPr>
+                        <m:oMath xmlns:m="http://schemas.openxmlformats.org/officeDocument/2006/math">
+                          <m:r>
+                            <a:rPr lang="fr-FR" sz="2400" b="0" i="1" smtClean="0">
+                              <a:solidFill>
+                                <a:srgbClr val="0070C0"/>
+                              </a:solidFill>
+                              <a:effectLst/>
+                              <a:latin typeface="Cambria Math" panose="02040503050406030204" pitchFamily="18" charset="0"/>
+                              <a:ea typeface="Calibri" panose="020F0502020204030204" pitchFamily="34" charset="0"/>
+                              <a:cs typeface="Times New Roman" panose="02020603050405020304" pitchFamily="18" charset="0"/>
+                            </a:rPr>
+                            <m:t>𝑡</m:t>
+                          </m:r>
+                        </m:oMath>
+                      </m:oMathPara>
+                    </a14:m>
+                    <a:endParaRPr lang="fr-FR" sz="2400" dirty="0">
+                      <a:solidFill>
+                        <a:srgbClr val="0070C0"/>
+                      </a:solidFill>
+                      <a:effectLst/>
+                      <a:ea typeface="Calibri" panose="020F0502020204030204" pitchFamily="34" charset="0"/>
+                      <a:cs typeface="Times New Roman" panose="02020603050405020304" pitchFamily="18" charset="0"/>
+                    </a:endParaRPr>
+                  </a:p>
+                  <a:p>
+                    <a:pPr>
+                      <a:lnSpc>
+                        <a:spcPct val="107000"/>
+                      </a:lnSpc>
+                      <a:spcAft>
+                        <a:spcPts val="800"/>
+                      </a:spcAft>
+                    </a:pPr>
+                    <a:r>
+                      <a:rPr lang="fr-FR" sz="2400" dirty="0">
+                        <a:effectLst/>
+                        <a:ea typeface="Calibri" panose="020F0502020204030204" pitchFamily="34" charset="0"/>
+                        <a:cs typeface="Times New Roman" panose="02020603050405020304" pitchFamily="18" charset="0"/>
+                      </a:rPr>
+                      <a:t> </a:t>
+                    </a:r>
+                  </a:p>
+                </p:txBody>
+              </p:sp>
+            </mc:Choice>
+            <mc:Fallback>
+              <p:sp>
+                <p:nvSpPr>
+                  <p:cNvPr id="43" name="Zone de texte 153"/>
+                  <p:cNvSpPr txBox="1">
+                    <a:spLocks noRot="1" noChangeAspect="1" noMove="1" noResize="1" noEditPoints="1" noAdjustHandles="1" noChangeArrowheads="1" noChangeShapeType="1" noTextEdit="1"/>
+                  </p:cNvSpPr>
+                  <p:nvPr/>
+                </p:nvSpPr>
+                <p:spPr>
+                  <a:xfrm>
+                    <a:off x="5197371" y="1257901"/>
+                    <a:ext cx="445966" cy="485203"/>
+                  </a:xfrm>
+                  <a:prstGeom prst="rect">
+                    <a:avLst/>
+                  </a:prstGeom>
+                  <a:blipFill rotWithShape="0">
+                    <a:blip r:embed="rId6"/>
+                    <a:stretch>
+                      <a:fillRect/>
+                    </a:stretch>
+                  </a:blipFill>
+                  <a:ln w="6350">
+                    <a:noFill/>
+                  </a:ln>
+                  <a:effectLst/>
+                </p:spPr>
+                <p:txBody>
+                  <a:bodyPr/>
+                  <a:lstStyle/>
+                  <a:p>
+                    <a:r>
+                      <a:rPr lang="fr-FR">
+                        <a:noFill/>
+                      </a:rPr>
+                      <a:t> </a:t>
+                    </a:r>
+                  </a:p>
+                </p:txBody>
+              </p:sp>
+            </mc:Fallback>
+          </mc:AlternateContent>
+        </p:grpSp>
+        <p:sp>
+          <p:nvSpPr>
+            <p:cNvPr id="53" name="Arc 52"/>
+            <p:cNvSpPr/>
+            <p:nvPr/>
+          </p:nvSpPr>
+          <p:spPr>
+            <a:xfrm rot="5724824">
+              <a:off x="4616415" y="2562622"/>
+              <a:ext cx="2356831" cy="2356831"/>
+            </a:xfrm>
+            <a:prstGeom prst="arc">
+              <a:avLst>
+                <a:gd name="adj1" fmla="val 18552621"/>
+                <a:gd name="adj2" fmla="val 0"/>
+              </a:avLst>
+            </a:prstGeom>
+            <a:ln w="38100">
+              <a:solidFill>
+                <a:schemeClr val="tx1"/>
+              </a:solidFill>
+              <a:headEnd type="arrow"/>
+            </a:ln>
+          </p:spPr>
+          <p:style>
+            <a:lnRef idx="1">
+              <a:schemeClr val="accent1"/>
+            </a:lnRef>
+            <a:fillRef idx="0">
+              <a:schemeClr val="accent1"/>
+            </a:fillRef>
+            <a:effectRef idx="0">
+              <a:schemeClr val="accent1"/>
+            </a:effectRef>
+            <a:fontRef idx="minor">
+              <a:schemeClr val="tx1"/>
+            </a:fontRef>
+          </p:style>
+          <p:txBody>
+            <a:bodyPr rtlCol="0" anchor="ctr"/>
+            <a:lstStyle/>
+            <a:p>
+              <a:pPr algn="ctr"/>
+              <a:endParaRPr lang="fr-FR"/>
+            </a:p>
+          </p:txBody>
+        </p:sp>
+        <mc:AlternateContent xmlns:mc="http://schemas.openxmlformats.org/markup-compatibility/2006">
+          <mc:Choice xmlns:a14="http://schemas.microsoft.com/office/drawing/2010/main" Requires="a14">
+            <p:sp>
+              <p:nvSpPr>
+                <p:cNvPr id="54" name="Zone de texte 153"/>
+                <p:cNvSpPr txBox="1"/>
+                <p:nvPr/>
+              </p:nvSpPr>
+              <p:spPr>
+                <a:xfrm>
+                  <a:off x="5949983" y="4712208"/>
+                  <a:ext cx="650214" cy="511035"/>
+                </a:xfrm>
+                <a:prstGeom prst="rect">
+                  <a:avLst/>
+                </a:prstGeom>
+                <a:noFill/>
+                <a:ln w="6350">
+                  <a:noFill/>
+                </a:ln>
+                <a:effectLst/>
+              </p:spPr>
+              <p:style>
+                <a:lnRef idx="0">
+                  <a:schemeClr val="accent1"/>
+                </a:lnRef>
+                <a:fillRef idx="0">
+                  <a:schemeClr val="accent1"/>
+                </a:fillRef>
+                <a:effectRef idx="0">
+                  <a:schemeClr val="accent1"/>
+                </a:effectRef>
+                <a:fontRef idx="minor">
+                  <a:schemeClr val="dk1"/>
+                </a:fontRef>
+              </p:style>
+              <p:txBody>
+                <a:bodyPr rot="0" spcFirstLastPara="0" vert="horz" wrap="square" lIns="91440" tIns="45720" rIns="91440" bIns="45720" numCol="1" spcCol="0" rtlCol="0" fromWordArt="0" anchor="t" anchorCtr="0" forceAA="0" compatLnSpc="1">
+                  <a:prstTxWarp prst="textNoShape">
+                    <a:avLst/>
+                  </a:prstTxWarp>
+                  <a:noAutofit/>
+                </a:bodyPr>
+                <a:lstStyle/>
+                <a:p>
+                  <a:pPr>
+                    <a:lnSpc>
+                      <a:spcPct val="107000"/>
+                    </a:lnSpc>
+                    <a:spcAft>
+                      <a:spcPts val="800"/>
+                    </a:spcAft>
+                  </a:pPr>
+                  <a14:m>
+                    <m:oMathPara xmlns:m="http://schemas.openxmlformats.org/officeDocument/2006/math">
+                      <m:oMathParaPr>
+                        <m:jc m:val="centerGroup"/>
+                      </m:oMathParaPr>
+                      <m:oMath xmlns:m="http://schemas.openxmlformats.org/officeDocument/2006/math">
+                        <m:r>
+                          <a:rPr lang="fr-FR" sz="2400" b="0" i="1" smtClean="0">
+                            <a:effectLst/>
+                            <a:latin typeface="Cambria Math" panose="02040503050406030204" pitchFamily="18" charset="0"/>
+                            <a:ea typeface="Calibri" panose="020F0502020204030204" pitchFamily="34" charset="0"/>
+                            <a:cs typeface="Times New Roman" panose="02020603050405020304" pitchFamily="18" charset="0"/>
+                          </a:rPr>
+                          <m:t>𝜑</m:t>
+                        </m:r>
+                      </m:oMath>
+                    </m:oMathPara>
+                  </a14:m>
+                  <a:endParaRPr lang="fr-FR" sz="2400" dirty="0">
+                    <a:effectLst/>
+                    <a:ea typeface="Calibri" panose="020F0502020204030204" pitchFamily="34" charset="0"/>
+                    <a:cs typeface="Times New Roman" panose="02020603050405020304" pitchFamily="18" charset="0"/>
+                  </a:endParaRPr>
+                </a:p>
+              </p:txBody>
+            </p:sp>
+          </mc:Choice>
+          <mc:Fallback>
+            <p:sp>
+              <p:nvSpPr>
+                <p:cNvPr id="54" name="Zone de texte 153"/>
+                <p:cNvSpPr txBox="1">
+                  <a:spLocks noRot="1" noChangeAspect="1" noMove="1" noResize="1" noEditPoints="1" noAdjustHandles="1" noChangeArrowheads="1" noChangeShapeType="1" noTextEdit="1"/>
+                </p:cNvSpPr>
+                <p:nvPr/>
+              </p:nvSpPr>
+              <p:spPr>
+                <a:xfrm>
+                  <a:off x="5949983" y="4712208"/>
+                  <a:ext cx="650214" cy="511035"/>
+                </a:xfrm>
+                <a:prstGeom prst="rect">
+                  <a:avLst/>
+                </a:prstGeom>
+                <a:blipFill rotWithShape="0">
+                  <a:blip r:embed="rId7"/>
+                  <a:stretch>
+                    <a:fillRect/>
+                  </a:stretch>
+                </a:blipFill>
+                <a:ln w="6350">
+                  <a:noFill/>
+                </a:ln>
+                <a:effectLst/>
+              </p:spPr>
+              <p:txBody>
+                <a:bodyPr/>
+                <a:lstStyle/>
+                <a:p>
+                  <a:r>
+                    <a:rPr lang="fr-FR">
+                      <a:noFill/>
+                    </a:rPr>
+                    <a:t> </a:t>
+                  </a:r>
+                </a:p>
+              </p:txBody>
+            </p:sp>
+          </mc:Fallback>
+        </mc:AlternateContent>
+      </p:grpSp>
+    </p:spTree>
+    <p:extLst>
+      <p:ext uri="{BB962C8B-B14F-4D97-AF65-F5344CB8AC3E}">
+        <p14:creationId xmlns:p14="http://schemas.microsoft.com/office/powerpoint/2010/main" val="3834753034"/>
       </p:ext>
     </p:extLst>
   </p:cSld>

</xml_diff>